<commit_message>
Corrected presentation slides and added survey results
</commit_message>
<xml_diff>
--- a/ArupPythonCourse-Introduction.pptx
+++ b/ArupPythonCourse-Introduction.pptx
@@ -6,7 +6,7 @@
     <p:sldMasterId id="2147483681" r:id="rId2"/>
   </p:sldMasterIdLst>
   <p:notesMasterIdLst>
-    <p:notesMasterId r:id="rId17"/>
+    <p:notesMasterId r:id="rId18"/>
   </p:notesMasterIdLst>
   <p:sldIdLst>
     <p:sldId id="257" r:id="rId3"/>
@@ -23,6 +23,7 @@
     <p:sldId id="278" r:id="rId14"/>
     <p:sldId id="281" r:id="rId15"/>
     <p:sldId id="279" r:id="rId16"/>
+    <p:sldId id="291" r:id="rId17"/>
   </p:sldIdLst>
   <p:sldSz cx="12192000" cy="6858000"/>
   <p:notesSz cx="6858000" cy="9144000"/>
@@ -1055,6 +1056,102 @@
 </p:notes>
 </file>
 
+<file path=ppt/notesSlides/notesSlide15.xml><?xml version="1.0" encoding="utf-8"?>
+<p:notes xmlns:a="http://schemas.openxmlformats.org/drawingml/2006/main" xmlns:r="http://schemas.openxmlformats.org/officeDocument/2006/relationships" xmlns:p="http://schemas.openxmlformats.org/presentationml/2006/main">
+  <p:cSld>
+    <p:spTree>
+      <p:nvGrpSpPr>
+        <p:cNvPr id="1" name=""/>
+        <p:cNvGrpSpPr/>
+        <p:nvPr/>
+      </p:nvGrpSpPr>
+      <p:grpSpPr>
+        <a:xfrm>
+          <a:off x="0" y="0"/>
+          <a:ext cx="0" cy="0"/>
+          <a:chOff x="0" y="0"/>
+          <a:chExt cx="0" cy="0"/>
+        </a:xfrm>
+      </p:grpSpPr>
+      <p:sp>
+        <p:nvSpPr>
+          <p:cNvPr id="2" name="Slide Image Placeholder 1"/>
+          <p:cNvSpPr>
+            <a:spLocks noGrp="1" noRot="1" noChangeAspect="1"/>
+          </p:cNvSpPr>
+          <p:nvPr>
+            <p:ph type="sldImg"/>
+          </p:nvPr>
+        </p:nvSpPr>
+        <p:spPr/>
+      </p:sp>
+      <p:sp>
+        <p:nvSpPr>
+          <p:cNvPr id="3" name="Notes Placeholder 2"/>
+          <p:cNvSpPr>
+            <a:spLocks noGrp="1"/>
+          </p:cNvSpPr>
+          <p:nvPr>
+            <p:ph type="body" idx="1"/>
+          </p:nvPr>
+        </p:nvSpPr>
+        <p:spPr/>
+        <p:txBody>
+          <a:bodyPr/>
+          <a:lstStyle/>
+          <a:p>
+            <a:pPr fontAlgn="base"/>
+            <a:endParaRPr lang="en-AU" sz="1200" b="0" i="0" kern="1200" dirty="0" smtClean="0">
+              <a:solidFill>
+                <a:schemeClr val="tx1"/>
+              </a:solidFill>
+              <a:effectLst/>
+              <a:latin typeface="+mn-lt"/>
+              <a:ea typeface="+mn-ea"/>
+              <a:cs typeface="+mn-cs"/>
+            </a:endParaRPr>
+          </a:p>
+          <a:p>
+            <a:endParaRPr lang="en-AU" dirty="0"/>
+          </a:p>
+        </p:txBody>
+      </p:sp>
+      <p:sp>
+        <p:nvSpPr>
+          <p:cNvPr id="4" name="Slide Number Placeholder 3"/>
+          <p:cNvSpPr>
+            <a:spLocks noGrp="1"/>
+          </p:cNvSpPr>
+          <p:nvPr>
+            <p:ph type="sldNum" sz="quarter" idx="10"/>
+          </p:nvPr>
+        </p:nvSpPr>
+        <p:spPr/>
+        <p:txBody>
+          <a:bodyPr/>
+          <a:lstStyle/>
+          <a:p>
+            <a:fld id="{8AE1FFB2-089C-4644-9E8F-2EB3D21445D1}" type="slidenum">
+              <a:rPr lang="en-AU" smtClean="0"/>
+              <a:t>15</a:t>
+            </a:fld>
+            <a:endParaRPr lang="en-AU"/>
+          </a:p>
+        </p:txBody>
+      </p:sp>
+    </p:spTree>
+    <p:extLst>
+      <p:ext uri="{BB962C8B-B14F-4D97-AF65-F5344CB8AC3E}">
+        <p14:creationId xmlns:p14="http://schemas.microsoft.com/office/powerpoint/2010/main" val="1329366087"/>
+      </p:ext>
+    </p:extLst>
+  </p:cSld>
+  <p:clrMapOvr>
+    <a:masterClrMapping/>
+  </p:clrMapOvr>
+</p:notes>
+</file>
+
 <file path=ppt/notesSlides/notesSlide2.xml><?xml version="1.0" encoding="utf-8"?>
 <p:notes xmlns:a="http://schemas.openxmlformats.org/drawingml/2006/main" xmlns:r="http://schemas.openxmlformats.org/officeDocument/2006/relationships" xmlns:p="http://schemas.openxmlformats.org/presentationml/2006/main">
   <p:cSld>
@@ -1185,33 +1282,6 @@
           <a:lstStyle/>
           <a:p>
             <a:pPr fontAlgn="base"/>
-            <a:r>
-              <a:rPr lang="en-AU" sz="1200" b="0" i="0" kern="1200" dirty="0" smtClean="0">
-                <a:solidFill>
-                  <a:schemeClr val="tx1"/>
-                </a:solidFill>
-                <a:effectLst/>
-                <a:latin typeface="+mn-lt"/>
-                <a:ea typeface="+mn-ea"/>
-                <a:cs typeface="+mn-cs"/>
-              </a:rPr>
-              <a:t>When</a:t>
-            </a:r>
-            <a:r>
-              <a:rPr lang="en-AU" sz="1200" b="0" i="0" kern="1200" baseline="0" dirty="0" smtClean="0">
-                <a:solidFill>
-                  <a:schemeClr val="tx1"/>
-                </a:solidFill>
-                <a:effectLst/>
-                <a:latin typeface="+mn-lt"/>
-                <a:ea typeface="+mn-ea"/>
-                <a:cs typeface="+mn-cs"/>
-              </a:rPr>
-              <a:t> someone thinks of computer programming this sought of thing comes to mind:</a:t>
-            </a:r>
-          </a:p>
-          <a:p>
-            <a:pPr fontAlgn="base"/>
             <a:endParaRPr lang="en-AU" sz="1200" b="0" i="0" kern="1200" dirty="0" smtClean="0">
               <a:solidFill>
                 <a:schemeClr val="tx1"/>
@@ -1223,108 +1293,14 @@
             </a:endParaRPr>
           </a:p>
           <a:p>
-            <a:pPr fontAlgn="base"/>
-            <a:r>
-              <a:rPr lang="en-AU" sz="1200" b="0" i="0" kern="1200" dirty="0" smtClean="0">
-                <a:solidFill>
-                  <a:schemeClr val="tx1"/>
-                </a:solidFill>
-                <a:effectLst/>
-                <a:latin typeface="+mn-lt"/>
-                <a:ea typeface="+mn-ea"/>
-                <a:cs typeface="+mn-cs"/>
-              </a:rPr>
-              <a:t>http://hackertyper.com/</a:t>
-            </a:r>
-          </a:p>
-          <a:p>
-            <a:pPr fontAlgn="base"/>
-            <a:endParaRPr lang="en-AU" sz="1200" b="0" i="0" kern="1200" dirty="0" smtClean="0">
-              <a:solidFill>
-                <a:schemeClr val="tx1"/>
-              </a:solidFill>
-              <a:effectLst/>
-              <a:latin typeface="+mn-lt"/>
-              <a:ea typeface="+mn-ea"/>
-              <a:cs typeface="+mn-cs"/>
-            </a:endParaRPr>
-          </a:p>
-          <a:p>
-            <a:pPr fontAlgn="base"/>
-            <a:r>
-              <a:rPr lang="en-AU" sz="1200" b="0" i="0" kern="1200" dirty="0" smtClean="0">
-                <a:solidFill>
-                  <a:schemeClr val="tx1"/>
-                </a:solidFill>
-                <a:effectLst/>
-                <a:latin typeface="+mn-lt"/>
-                <a:ea typeface="+mn-ea"/>
-                <a:cs typeface="+mn-cs"/>
-              </a:rPr>
-              <a:t>Python is a programming</a:t>
-            </a:r>
-            <a:r>
-              <a:rPr lang="en-AU" sz="1200" b="0" i="0" kern="1200" baseline="0" dirty="0" smtClean="0">
-                <a:solidFill>
-                  <a:schemeClr val="tx1"/>
-                </a:solidFill>
-                <a:effectLst/>
-                <a:latin typeface="+mn-lt"/>
-                <a:ea typeface="+mn-ea"/>
-                <a:cs typeface="+mn-cs"/>
-              </a:rPr>
-              <a:t> language. Virtually all software you have used was built using a programming language like python. The key word is language. It is a way to communicate with a computer. To give it instructions to do something. I could speak to it. But it makes more sense to write it down.</a:t>
-            </a:r>
-          </a:p>
-          <a:p>
-            <a:pPr fontAlgn="base"/>
-            <a:endParaRPr lang="en-AU" sz="1200" b="0" i="0" kern="1200" baseline="0" dirty="0" smtClean="0">
-              <a:solidFill>
-                <a:schemeClr val="tx1"/>
-              </a:solidFill>
-              <a:effectLst/>
-              <a:latin typeface="+mn-lt"/>
-              <a:ea typeface="+mn-ea"/>
-              <a:cs typeface="+mn-cs"/>
-            </a:endParaRPr>
-          </a:p>
-          <a:p>
-            <a:pPr fontAlgn="base"/>
-            <a:r>
-              <a:rPr lang="en-AU" sz="1200" b="0" i="0" kern="1200" baseline="0" dirty="0" smtClean="0">
-                <a:solidFill>
-                  <a:schemeClr val="tx1"/>
-                </a:solidFill>
-                <a:effectLst/>
-                <a:latin typeface="+mn-lt"/>
-                <a:ea typeface="+mn-ea"/>
-                <a:cs typeface="+mn-cs"/>
-              </a:rPr>
-              <a:t>There is a program on my computer called a python interpreter. It interprets what I am telling it to do and gives that to the computer in a language it understands.</a:t>
-            </a:r>
-            <a:endParaRPr lang="en-AU" sz="1200" b="0" i="0" kern="1200" dirty="0" smtClean="0">
-              <a:solidFill>
-                <a:schemeClr val="tx1"/>
-              </a:solidFill>
-              <a:effectLst/>
-              <a:latin typeface="+mn-lt"/>
-              <a:ea typeface="+mn-ea"/>
-              <a:cs typeface="+mn-cs"/>
-            </a:endParaRPr>
-          </a:p>
-          <a:p>
-            <a:pPr fontAlgn="base"/>
-            <a:endParaRPr lang="en-AU" sz="1200" b="0" i="0" kern="1200" dirty="0" smtClean="0">
-              <a:solidFill>
-                <a:schemeClr val="tx1"/>
-              </a:solidFill>
-              <a:effectLst/>
-              <a:latin typeface="+mn-lt"/>
-              <a:ea typeface="+mn-ea"/>
-              <a:cs typeface="+mn-cs"/>
-            </a:endParaRPr>
-          </a:p>
-          <a:p>
+            <a:r>
+              <a:rPr lang="en-AU" dirty="0" smtClean="0"/>
+              <a:t>I get asked this a lot and I would like to</a:t>
+            </a:r>
+            <a:r>
+              <a:rPr lang="en-AU" baseline="0" dirty="0" smtClean="0"/>
+              <a:t> take a few minutes to explain so you know what you are signing up for.</a:t>
+            </a:r>
             <a:endParaRPr lang="en-AU" dirty="0"/>
           </a:p>
         </p:txBody>
@@ -1447,111 +1423,6 @@
               <a:cs typeface="+mn-cs"/>
             </a:endParaRPr>
           </a:p>
-          <a:p>
-            <a:pPr fontAlgn="base"/>
-            <a:r>
-              <a:rPr lang="en-AU" sz="1200" b="0" i="0" kern="1200" dirty="0" smtClean="0">
-                <a:solidFill>
-                  <a:schemeClr val="tx1"/>
-                </a:solidFill>
-                <a:effectLst/>
-                <a:latin typeface="+mn-lt"/>
-                <a:ea typeface="+mn-ea"/>
-                <a:cs typeface="+mn-cs"/>
-              </a:rPr>
-              <a:t>http://hackertyper.com/</a:t>
-            </a:r>
-          </a:p>
-          <a:p>
-            <a:pPr fontAlgn="base"/>
-            <a:endParaRPr lang="en-AU" sz="1200" b="0" i="0" kern="1200" dirty="0" smtClean="0">
-              <a:solidFill>
-                <a:schemeClr val="tx1"/>
-              </a:solidFill>
-              <a:effectLst/>
-              <a:latin typeface="+mn-lt"/>
-              <a:ea typeface="+mn-ea"/>
-              <a:cs typeface="+mn-cs"/>
-            </a:endParaRPr>
-          </a:p>
-          <a:p>
-            <a:pPr fontAlgn="base"/>
-            <a:r>
-              <a:rPr lang="en-AU" sz="1200" b="0" i="0" kern="1200" dirty="0" smtClean="0">
-                <a:solidFill>
-                  <a:schemeClr val="tx1"/>
-                </a:solidFill>
-                <a:effectLst/>
-                <a:latin typeface="+mn-lt"/>
-                <a:ea typeface="+mn-ea"/>
-                <a:cs typeface="+mn-cs"/>
-              </a:rPr>
-              <a:t>Python is a programming</a:t>
-            </a:r>
-            <a:r>
-              <a:rPr lang="en-AU" sz="1200" b="0" i="0" kern="1200" baseline="0" dirty="0" smtClean="0">
-                <a:solidFill>
-                  <a:schemeClr val="tx1"/>
-                </a:solidFill>
-                <a:effectLst/>
-                <a:latin typeface="+mn-lt"/>
-                <a:ea typeface="+mn-ea"/>
-                <a:cs typeface="+mn-cs"/>
-              </a:rPr>
-              <a:t> language. Virtually all software you have used was built using a programming language like python. The key word is language. It is a way to communicate with a computer. To give it instructions to do something. I could speak to it. But it makes more sense to write it down.</a:t>
-            </a:r>
-          </a:p>
-          <a:p>
-            <a:pPr fontAlgn="base"/>
-            <a:endParaRPr lang="en-AU" sz="1200" b="0" i="0" kern="1200" baseline="0" dirty="0" smtClean="0">
-              <a:solidFill>
-                <a:schemeClr val="tx1"/>
-              </a:solidFill>
-              <a:effectLst/>
-              <a:latin typeface="+mn-lt"/>
-              <a:ea typeface="+mn-ea"/>
-              <a:cs typeface="+mn-cs"/>
-            </a:endParaRPr>
-          </a:p>
-          <a:p>
-            <a:pPr fontAlgn="base"/>
-            <a:r>
-              <a:rPr lang="en-AU" sz="1200" b="0" i="0" kern="1200" baseline="0" dirty="0" smtClean="0">
-                <a:solidFill>
-                  <a:schemeClr val="tx1"/>
-                </a:solidFill>
-                <a:effectLst/>
-                <a:latin typeface="+mn-lt"/>
-                <a:ea typeface="+mn-ea"/>
-                <a:cs typeface="+mn-cs"/>
-              </a:rPr>
-              <a:t>There is a program on my computer called a python interpreter. It interprets what I am telling it to do and gives that to the computer in a language it understands.</a:t>
-            </a:r>
-            <a:endParaRPr lang="en-AU" sz="1200" b="0" i="0" kern="1200" dirty="0" smtClean="0">
-              <a:solidFill>
-                <a:schemeClr val="tx1"/>
-              </a:solidFill>
-              <a:effectLst/>
-              <a:latin typeface="+mn-lt"/>
-              <a:ea typeface="+mn-ea"/>
-              <a:cs typeface="+mn-cs"/>
-            </a:endParaRPr>
-          </a:p>
-          <a:p>
-            <a:pPr fontAlgn="base"/>
-            <a:endParaRPr lang="en-AU" sz="1200" b="0" i="0" kern="1200" dirty="0" smtClean="0">
-              <a:solidFill>
-                <a:schemeClr val="tx1"/>
-              </a:solidFill>
-              <a:effectLst/>
-              <a:latin typeface="+mn-lt"/>
-              <a:ea typeface="+mn-ea"/>
-              <a:cs typeface="+mn-cs"/>
-            </a:endParaRPr>
-          </a:p>
-          <a:p>
-            <a:endParaRPr lang="en-AU" dirty="0"/>
-          </a:p>
         </p:txBody>
       </p:sp>
       <p:sp>
@@ -1645,10 +1516,10 @@
                 <a:ea typeface="+mn-ea"/>
                 <a:cs typeface="+mn-cs"/>
               </a:rPr>
-              <a:t>When</a:t>
-            </a:r>
-            <a:r>
-              <a:rPr lang="en-AU" sz="1200" b="0" i="0" kern="1200" baseline="0" dirty="0" smtClean="0">
+              <a:t>Python </a:t>
+            </a:r>
+            <a:r>
+              <a:rPr lang="en-AU" sz="1200" b="0" i="0" kern="1200" dirty="0" smtClean="0">
                 <a:solidFill>
                   <a:schemeClr val="tx1"/>
                 </a:solidFill>
@@ -1657,61 +1528,7 @@
                 <a:ea typeface="+mn-ea"/>
                 <a:cs typeface="+mn-cs"/>
               </a:rPr>
-              <a:t> someone thinks of computer programming this sought of thing comes to mind:</a:t>
-            </a:r>
-          </a:p>
-          <a:p>
-            <a:pPr fontAlgn="base"/>
-            <a:endParaRPr lang="en-AU" sz="1200" b="0" i="0" kern="1200" dirty="0" smtClean="0">
-              <a:solidFill>
-                <a:schemeClr val="tx1"/>
-              </a:solidFill>
-              <a:effectLst/>
-              <a:latin typeface="+mn-lt"/>
-              <a:ea typeface="+mn-ea"/>
-              <a:cs typeface="+mn-cs"/>
-            </a:endParaRPr>
-          </a:p>
-          <a:p>
-            <a:pPr fontAlgn="base"/>
-            <a:r>
-              <a:rPr lang="en-AU" sz="1200" b="0" i="0" kern="1200" dirty="0" smtClean="0">
-                <a:solidFill>
-                  <a:schemeClr val="tx1"/>
-                </a:solidFill>
-                <a:effectLst/>
-                <a:latin typeface="+mn-lt"/>
-                <a:ea typeface="+mn-ea"/>
-                <a:cs typeface="+mn-cs"/>
-              </a:rPr>
-              <a:t>http://hackertyper.com/</a:t>
-            </a:r>
-          </a:p>
-          <a:p>
-            <a:pPr fontAlgn="base"/>
-            <a:endParaRPr lang="en-AU" sz="1200" b="0" i="0" kern="1200" dirty="0" smtClean="0">
-              <a:solidFill>
-                <a:schemeClr val="tx1"/>
-              </a:solidFill>
-              <a:effectLst/>
-              <a:latin typeface="+mn-lt"/>
-              <a:ea typeface="+mn-ea"/>
-              <a:cs typeface="+mn-cs"/>
-            </a:endParaRPr>
-          </a:p>
-          <a:p>
-            <a:pPr fontAlgn="base"/>
-            <a:r>
-              <a:rPr lang="en-AU" sz="1200" b="0" i="0" kern="1200" dirty="0" smtClean="0">
-                <a:solidFill>
-                  <a:schemeClr val="tx1"/>
-                </a:solidFill>
-                <a:effectLst/>
-                <a:latin typeface="+mn-lt"/>
-                <a:ea typeface="+mn-ea"/>
-                <a:cs typeface="+mn-cs"/>
-              </a:rPr>
-              <a:t>Python is a programming</a:t>
+              <a:t>is a programming</a:t>
             </a:r>
             <a:r>
               <a:rPr lang="en-AU" sz="1200" b="0" i="0" kern="1200" baseline="0" dirty="0" smtClean="0">
@@ -24966,15 +24783,7 @@
           <a:p>
             <a:r>
               <a:rPr lang="en-AU" sz="3200" dirty="0" smtClean="0"/>
-              <a:t>Automating </a:t>
-            </a:r>
-            <a:r>
-              <a:rPr lang="en-AU" sz="3200" dirty="0" smtClean="0"/>
-              <a:t>the boring </a:t>
-            </a:r>
-            <a:r>
-              <a:rPr lang="en-AU" sz="3200" dirty="0" smtClean="0"/>
-              <a:t>stuff with Python</a:t>
+              <a:t>Automating the boring stuff with Python</a:t>
             </a:r>
             <a:endParaRPr lang="en-AU" sz="3200" dirty="0"/>
           </a:p>
@@ -25082,11 +24891,7 @@
             </a:r>
             <a:r>
               <a:rPr lang="en-AU" dirty="0" smtClean="0"/>
-              <a:t>spreadsheets and the </a:t>
-            </a:r>
-            <a:r>
-              <a:rPr lang="en-AU" dirty="0" smtClean="0"/>
-              <a:t>like</a:t>
+              <a:t>spreadsheets and the like</a:t>
             </a:r>
           </a:p>
           <a:p>
@@ -25098,7 +24903,6 @@
               <a:rPr lang="en-AU" dirty="0" smtClean="0"/>
               <a:t>Write scripts to do engineering calculations</a:t>
             </a:r>
-            <a:endParaRPr lang="en-AU" dirty="0" smtClean="0"/>
           </a:p>
           <a:p>
             <a:pPr marL="342900" indent="-342900" fontAlgn="base">
@@ -25192,7 +24996,6 @@
               <a:rPr lang="en-AU" sz="4400" dirty="0"/>
               <a:t>What can you expect to gain from this course</a:t>
             </a:r>
-            <a:endParaRPr lang="en-AU" sz="4400" dirty="0"/>
           </a:p>
         </p:txBody>
       </p:sp>
@@ -25296,14 +25099,14 @@
           <p:nvPr>
             <p:extLst>
               <p:ext uri="{D42A27DB-BD31-4B8C-83A1-F6EECF244321}">
-                <p14:modId xmlns:p14="http://schemas.microsoft.com/office/powerpoint/2010/main" val="1075268627"/>
+                <p14:modId xmlns:p14="http://schemas.microsoft.com/office/powerpoint/2010/main" val="1450620192"/>
               </p:ext>
             </p:extLst>
           </p:nvPr>
         </p:nvGraphicFramePr>
         <p:xfrm>
-          <a:off x="2477127" y="930467"/>
-          <a:ext cx="7271027" cy="5169222"/>
+          <a:off x="2463875" y="1036485"/>
+          <a:ext cx="7271027" cy="4807458"/>
         </p:xfrm>
         <a:graphic>
           <a:graphicData uri="http://schemas.openxmlformats.org/drawingml/2006/table">
@@ -25327,10 +25130,10 @@
                         </a:lnSpc>
                       </a:pPr>
                       <a:r>
-                        <a:rPr lang="en-AU" sz="2400" b="0" dirty="0" smtClean="0"/>
+                        <a:rPr lang="en-AU" sz="2200" b="0" dirty="0" smtClean="0"/>
                         <a:t>Session 0</a:t>
                       </a:r>
-                      <a:endParaRPr lang="en-AU" sz="2400" b="0" dirty="0"/>
+                      <a:endParaRPr lang="en-AU" sz="2200" b="0" dirty="0"/>
                     </a:p>
                   </a:txBody>
                   <a:tcPr anchor="ctr"/>
@@ -25346,14 +25149,14 @@
                         </a:lnSpc>
                       </a:pPr>
                       <a:r>
-                        <a:rPr lang="en-AU" sz="2400" b="0" dirty="0" smtClean="0"/>
+                        <a:rPr lang="en-AU" sz="2200" b="0" dirty="0" smtClean="0"/>
                         <a:t>Pre-Work. Do</a:t>
                       </a:r>
                       <a:r>
-                        <a:rPr lang="en-AU" sz="2400" b="0" baseline="0" dirty="0" smtClean="0"/>
+                        <a:rPr lang="en-AU" sz="2200" b="0" baseline="0" dirty="0" smtClean="0"/>
                         <a:t> this at home</a:t>
                       </a:r>
-                      <a:endParaRPr lang="en-AU" sz="2400" b="0" dirty="0"/>
+                      <a:endParaRPr lang="en-AU" sz="2200" b="0" dirty="0"/>
                     </a:p>
                   </a:txBody>
                   <a:tcPr anchor="ctr"/>
@@ -25371,10 +25174,10 @@
                         </a:lnSpc>
                       </a:pPr>
                       <a:r>
-                        <a:rPr lang="en-AU" sz="2400" dirty="0" smtClean="0"/>
+                        <a:rPr lang="en-AU" sz="2200" dirty="0" smtClean="0"/>
                         <a:t>Session 1</a:t>
                       </a:r>
-                      <a:endParaRPr lang="en-AU" sz="2400" dirty="0"/>
+                      <a:endParaRPr lang="en-AU" sz="2200" dirty="0"/>
                     </a:p>
                   </a:txBody>
                   <a:tcPr anchor="ctr"/>
@@ -25390,10 +25193,10 @@
                         </a:lnSpc>
                       </a:pPr>
                       <a:r>
-                        <a:rPr lang="en-AU" sz="2400" dirty="0" smtClean="0"/>
+                        <a:rPr lang="en-AU" sz="2200" dirty="0" smtClean="0"/>
                         <a:t>Python Basic</a:t>
                       </a:r>
-                      <a:endParaRPr lang="en-AU" sz="2400" dirty="0"/>
+                      <a:endParaRPr lang="en-AU" sz="2200" dirty="0"/>
                     </a:p>
                   </a:txBody>
                   <a:tcPr anchor="ctr"/>
@@ -25411,14 +25214,14 @@
                         </a:lnSpc>
                       </a:pPr>
                       <a:r>
-                        <a:rPr lang="en-AU" sz="2400" dirty="0" smtClean="0"/>
+                        <a:rPr lang="en-AU" sz="2200" dirty="0" smtClean="0"/>
                         <a:t>Session</a:t>
                       </a:r>
                       <a:r>
-                        <a:rPr lang="en-AU" sz="2400" baseline="0" dirty="0" smtClean="0"/>
+                        <a:rPr lang="en-AU" sz="2200" baseline="0" dirty="0" smtClean="0"/>
                         <a:t> 2</a:t>
                       </a:r>
-                      <a:endParaRPr lang="en-AU" sz="2400" dirty="0"/>
+                      <a:endParaRPr lang="en-AU" sz="2200" dirty="0"/>
                     </a:p>
                   </a:txBody>
                   <a:tcPr anchor="ctr"/>
@@ -25446,10 +25249,10 @@
                         </a:lnSpc>
                       </a:pPr>
                       <a:r>
-                        <a:rPr lang="en-AU" sz="2400" dirty="0" smtClean="0"/>
+                        <a:rPr lang="en-AU" sz="2200" dirty="0" smtClean="0"/>
                         <a:t>Session 3</a:t>
                       </a:r>
-                      <a:endParaRPr lang="en-AU" sz="2400" dirty="0"/>
+                      <a:endParaRPr lang="en-AU" sz="2200" dirty="0"/>
                     </a:p>
                   </a:txBody>
                   <a:tcPr anchor="ctr"/>
@@ -25477,10 +25280,10 @@
                         </a:lnSpc>
                       </a:pPr>
                       <a:r>
-                        <a:rPr lang="en-AU" sz="2400" dirty="0" smtClean="0"/>
+                        <a:rPr lang="en-AU" sz="2200" dirty="0" smtClean="0"/>
                         <a:t>Session 4</a:t>
                       </a:r>
-                      <a:endParaRPr lang="en-AU" sz="2400" dirty="0"/>
+                      <a:endParaRPr lang="en-AU" sz="2200" dirty="0"/>
                     </a:p>
                   </a:txBody>
                   <a:tcPr anchor="ctr"/>
@@ -25496,14 +25299,14 @@
                         </a:lnSpc>
                       </a:pPr>
                       <a:r>
-                        <a:rPr lang="en-AU" sz="2400" dirty="0" smtClean="0"/>
+                        <a:rPr lang="en-AU" sz="2200" dirty="0" smtClean="0"/>
                         <a:t>Solve</a:t>
                       </a:r>
                       <a:r>
-                        <a:rPr lang="en-AU" sz="2400" baseline="0" dirty="0" smtClean="0"/>
+                        <a:rPr lang="en-AU" sz="2200" baseline="0" dirty="0" smtClean="0"/>
                         <a:t> some typical problems</a:t>
                       </a:r>
-                      <a:endParaRPr lang="en-AU" sz="2400" dirty="0"/>
+                      <a:endParaRPr lang="en-AU" sz="2200" dirty="0"/>
                     </a:p>
                   </a:txBody>
                   <a:tcPr anchor="ctr"/>
@@ -25521,10 +25324,10 @@
                         </a:lnSpc>
                       </a:pPr>
                       <a:r>
-                        <a:rPr lang="en-AU" sz="2400" dirty="0" smtClean="0"/>
+                        <a:rPr lang="en-AU" sz="2200" dirty="0" smtClean="0"/>
                         <a:t>Session 5</a:t>
                       </a:r>
-                      <a:endParaRPr lang="en-AU" sz="2400" dirty="0"/>
+                      <a:endParaRPr lang="en-AU" sz="2200" dirty="0"/>
                     </a:p>
                   </a:txBody>
                   <a:tcPr anchor="ctr"/>
@@ -25540,14 +25343,14 @@
                         </a:lnSpc>
                       </a:pPr>
                       <a:r>
-                        <a:rPr lang="en-AU" sz="2400" dirty="0" smtClean="0"/>
+                        <a:rPr lang="en-AU" sz="2200" dirty="0" smtClean="0"/>
                         <a:t>Group</a:t>
                       </a:r>
                       <a:r>
-                        <a:rPr lang="en-AU" sz="2400" baseline="0" dirty="0" smtClean="0"/>
+                        <a:rPr lang="en-AU" sz="2200" baseline="0" dirty="0" smtClean="0"/>
                         <a:t> project</a:t>
                       </a:r>
-                      <a:endParaRPr lang="en-AU" sz="2400" dirty="0"/>
+                      <a:endParaRPr lang="en-AU" sz="2200" dirty="0"/>
                     </a:p>
                   </a:txBody>
                   <a:tcPr anchor="ctr"/>
@@ -25565,10 +25368,10 @@
                         </a:lnSpc>
                       </a:pPr>
                       <a:r>
-                        <a:rPr lang="en-AU" sz="2400" dirty="0" smtClean="0"/>
+                        <a:rPr lang="en-AU" sz="2200" dirty="0" smtClean="0"/>
                         <a:t>Session 6</a:t>
                       </a:r>
-                      <a:endParaRPr lang="en-AU" sz="2400" dirty="0"/>
+                      <a:endParaRPr lang="en-AU" sz="2200" dirty="0"/>
                     </a:p>
                   </a:txBody>
                   <a:tcPr anchor="ctr"/>
@@ -25584,14 +25387,14 @@
                         </a:lnSpc>
                       </a:pPr>
                       <a:r>
-                        <a:rPr lang="en-AU" sz="2400" dirty="0" smtClean="0"/>
+                        <a:rPr lang="en-AU" sz="2200" dirty="0" smtClean="0"/>
                         <a:t>How to work as a group</a:t>
                       </a:r>
                       <a:r>
-                        <a:rPr lang="en-AU" sz="2400" baseline="0" dirty="0" smtClean="0"/>
+                        <a:rPr lang="en-AU" sz="2200" baseline="0" dirty="0" smtClean="0"/>
                         <a:t> and best practice</a:t>
                       </a:r>
-                      <a:endParaRPr lang="en-AU" sz="2400" dirty="0"/>
+                      <a:endParaRPr lang="en-AU" sz="2200" dirty="0"/>
                     </a:p>
                   </a:txBody>
                   <a:tcPr anchor="ctr"/>
@@ -25609,10 +25412,10 @@
                         </a:lnSpc>
                       </a:pPr>
                       <a:r>
-                        <a:rPr lang="en-AU" sz="2400" dirty="0" smtClean="0"/>
+                        <a:rPr lang="en-AU" sz="2200" dirty="0" smtClean="0"/>
                         <a:t>Session 7</a:t>
                       </a:r>
-                      <a:endParaRPr lang="en-AU" sz="2400" dirty="0"/>
+                      <a:endParaRPr lang="en-AU" sz="2200" dirty="0"/>
                     </a:p>
                   </a:txBody>
                   <a:tcPr anchor="ctr"/>
@@ -25640,14 +25443,14 @@
                         <a:defRPr/>
                       </a:pPr>
                       <a:r>
-                        <a:rPr lang="en-AU" sz="2400" dirty="0" smtClean="0"/>
+                        <a:rPr lang="en-AU" sz="2200" dirty="0" smtClean="0"/>
                         <a:t>Group</a:t>
                       </a:r>
                       <a:r>
-                        <a:rPr lang="en-AU" sz="2400" baseline="0" dirty="0" smtClean="0"/>
+                        <a:rPr lang="en-AU" sz="2200" baseline="0" dirty="0" smtClean="0"/>
                         <a:t> project</a:t>
                       </a:r>
-                      <a:endParaRPr lang="en-AU" sz="2400" dirty="0" smtClean="0"/>
+                      <a:endParaRPr lang="en-AU" sz="2200" dirty="0" smtClean="0"/>
                     </a:p>
                   </a:txBody>
                   <a:tcPr anchor="ctr"/>
@@ -25665,10 +25468,10 @@
                         </a:lnSpc>
                       </a:pPr>
                       <a:r>
-                        <a:rPr lang="en-AU" sz="2400" dirty="0" smtClean="0"/>
+                        <a:rPr lang="en-AU" sz="2200" dirty="0" smtClean="0"/>
                         <a:t>Session 8</a:t>
                       </a:r>
-                      <a:endParaRPr lang="en-AU" sz="2400" dirty="0"/>
+                      <a:endParaRPr lang="en-AU" sz="2200" dirty="0"/>
                     </a:p>
                   </a:txBody>
                   <a:tcPr anchor="ctr"/>
@@ -25696,14 +25499,14 @@
                         <a:defRPr/>
                       </a:pPr>
                       <a:r>
-                        <a:rPr lang="en-AU" sz="2400" dirty="0" smtClean="0"/>
+                        <a:rPr lang="en-AU" sz="2200" dirty="0" smtClean="0"/>
                         <a:t>Group</a:t>
                       </a:r>
                       <a:r>
-                        <a:rPr lang="en-AU" sz="2400" baseline="0" dirty="0" smtClean="0"/>
+                        <a:rPr lang="en-AU" sz="2200" baseline="0" dirty="0" smtClean="0"/>
                         <a:t> project</a:t>
                       </a:r>
-                      <a:endParaRPr lang="en-AU" sz="2400" dirty="0" smtClean="0"/>
+                      <a:endParaRPr lang="en-AU" sz="2200" dirty="0" smtClean="0"/>
                     </a:p>
                   </a:txBody>
                   <a:tcPr anchor="ctr"/>
@@ -25786,7 +25589,6 @@
               <a:rPr lang="en-AU" dirty="0" smtClean="0"/>
               <a:t>This course is for anyone who wants to learn!</a:t>
             </a:r>
-            <a:endParaRPr lang="en-AU" dirty="0" smtClean="0"/>
           </a:p>
           <a:p>
             <a:pPr marL="342900" indent="-342900">
@@ -25951,7 +25753,6 @@
               <a:rPr lang="en-AU" dirty="0" smtClean="0"/>
               <a:t>Courses start on the first week of July</a:t>
             </a:r>
-            <a:endParaRPr lang="en-AU" dirty="0" smtClean="0"/>
           </a:p>
           <a:p>
             <a:pPr marL="342900" indent="-342900">
@@ -26097,10 +25898,217 @@
           </a:p>
         </p:txBody>
       </p:sp>
+      <p:sp>
+        <p:nvSpPr>
+          <p:cNvPr id="3" name="TextBox 2"/>
+          <p:cNvSpPr txBox="1"/>
+          <p:nvPr/>
+        </p:nvSpPr>
+        <p:spPr>
+          <a:xfrm>
+            <a:off x="7580243" y="5605670"/>
+            <a:ext cx="5088835" cy="461665"/>
+          </a:xfrm>
+          <a:prstGeom prst="rect">
+            <a:avLst/>
+          </a:prstGeom>
+          <a:noFill/>
+        </p:spPr>
+        <p:txBody>
+          <a:bodyPr wrap="square" rtlCol="0">
+            <a:spAutoFit/>
+          </a:bodyPr>
+          <a:lstStyle/>
+          <a:p>
+            <a:r>
+              <a:rPr lang="en-AU" sz="2400" dirty="0">
+                <a:solidFill>
+                  <a:srgbClr val="666666"/>
+                </a:solidFill>
+                <a:latin typeface="Times New Roman"/>
+                <a:cs typeface="Times New Roman"/>
+              </a:rPr>
+              <a:t>(Survey </a:t>
+            </a:r>
+            <a:r>
+              <a:rPr lang="en-AU" sz="2400" dirty="0">
+                <a:solidFill>
+                  <a:srgbClr val="666666"/>
+                </a:solidFill>
+                <a:latin typeface="Times New Roman"/>
+                <a:cs typeface="Times New Roman"/>
+              </a:rPr>
+              <a:t>Results on the </a:t>
+            </a:r>
+            <a:r>
+              <a:rPr lang="en-AU" sz="2400" dirty="0">
+                <a:solidFill>
+                  <a:srgbClr val="666666"/>
+                </a:solidFill>
+                <a:latin typeface="Times New Roman"/>
+                <a:cs typeface="Times New Roman"/>
+              </a:rPr>
+              <a:t>next slide)</a:t>
+            </a:r>
+            <a:endParaRPr lang="en-AU" sz="2400" dirty="0">
+              <a:solidFill>
+                <a:srgbClr val="666666"/>
+              </a:solidFill>
+              <a:latin typeface="Times New Roman"/>
+              <a:cs typeface="Times New Roman"/>
+            </a:endParaRPr>
+          </a:p>
+        </p:txBody>
+      </p:sp>
     </p:spTree>
     <p:extLst>
       <p:ext uri="{BB962C8B-B14F-4D97-AF65-F5344CB8AC3E}">
         <p14:creationId xmlns:p14="http://schemas.microsoft.com/office/powerpoint/2010/main" val="819659976"/>
+      </p:ext>
+    </p:extLst>
+  </p:cSld>
+  <p:clrMapOvr>
+    <a:masterClrMapping/>
+  </p:clrMapOvr>
+  <mc:AlternateContent xmlns:mc="http://schemas.openxmlformats.org/markup-compatibility/2006" xmlns:p14="http://schemas.microsoft.com/office/powerpoint/2010/main">
+    <mc:Choice Requires="p14">
+      <p:transition spd="med" p14:dur="700">
+        <p:fade/>
+      </p:transition>
+    </mc:Choice>
+    <mc:Fallback xmlns="">
+      <p:transition spd="med">
+        <p:fade/>
+      </p:transition>
+    </mc:Fallback>
+  </mc:AlternateContent>
+  <p:timing>
+    <p:tnLst>
+      <p:par>
+        <p:cTn id="1" dur="indefinite" restart="never" nodeType="tmRoot"/>
+      </p:par>
+    </p:tnLst>
+  </p:timing>
+</p:sld>
+</file>
+
+<file path=ppt/slides/slide15.xml><?xml version="1.0" encoding="utf-8"?>
+<p:sld xmlns:a="http://schemas.openxmlformats.org/drawingml/2006/main" xmlns:r="http://schemas.openxmlformats.org/officeDocument/2006/relationships" xmlns:p="http://schemas.openxmlformats.org/presentationml/2006/main">
+  <p:cSld>
+    <p:spTree>
+      <p:nvGrpSpPr>
+        <p:cNvPr id="1" name=""/>
+        <p:cNvGrpSpPr/>
+        <p:nvPr/>
+      </p:nvGrpSpPr>
+      <p:grpSpPr>
+        <a:xfrm>
+          <a:off x="0" y="0"/>
+          <a:ext cx="0" cy="0"/>
+          <a:chOff x="0" y="0"/>
+          <a:chExt cx="0" cy="0"/>
+        </a:xfrm>
+      </p:grpSpPr>
+      <p:sp>
+        <p:nvSpPr>
+          <p:cNvPr id="2" name="Title 1"/>
+          <p:cNvSpPr>
+            <a:spLocks noGrp="1"/>
+          </p:cNvSpPr>
+          <p:nvPr>
+            <p:ph type="title"/>
+          </p:nvPr>
+        </p:nvSpPr>
+        <p:spPr/>
+        <p:txBody>
+          <a:bodyPr/>
+          <a:lstStyle/>
+          <a:p>
+            <a:r>
+              <a:rPr lang="en-AU" sz="4400" dirty="0" smtClean="0"/>
+              <a:t>Survey</a:t>
+            </a:r>
+            <a:endParaRPr lang="en-AU" sz="4400" dirty="0"/>
+          </a:p>
+        </p:txBody>
+      </p:sp>
+      <p:sp>
+        <p:nvSpPr>
+          <p:cNvPr id="5" name="Content Placeholder 5"/>
+          <p:cNvSpPr>
+            <a:spLocks noGrp="1"/>
+          </p:cNvSpPr>
+          <p:nvPr>
+            <p:ph sz="quarter" idx="10"/>
+          </p:nvPr>
+        </p:nvSpPr>
+        <p:spPr>
+          <a:xfrm>
+            <a:off x="976712" y="1196632"/>
+            <a:ext cx="9055184" cy="4796185"/>
+          </a:xfrm>
+        </p:spPr>
+        <p:txBody>
+          <a:bodyPr/>
+          <a:lstStyle/>
+          <a:p>
+            <a:pPr marL="342900" indent="-342900">
+              <a:buFont typeface="Arial" panose="020B0604020202020204" pitchFamily="34" charset="0"/>
+              <a:buChar char="•"/>
+            </a:pPr>
+            <a:r>
+              <a:rPr lang="en-AU" dirty="0" smtClean="0"/>
+              <a:t>110 people responded and want to join the course</a:t>
+            </a:r>
+          </a:p>
+          <a:p>
+            <a:pPr marL="342900" indent="-342900">
+              <a:buFont typeface="Arial" panose="020B0604020202020204" pitchFamily="34" charset="0"/>
+              <a:buChar char="•"/>
+            </a:pPr>
+            <a:r>
+              <a:rPr lang="en-AU" dirty="0" smtClean="0"/>
+              <a:t>90% think Arup will greatly benefit from this</a:t>
+            </a:r>
+            <a:endParaRPr lang="en-AU" dirty="0"/>
+          </a:p>
+          <a:p>
+            <a:pPr marL="342900" indent="-342900">
+              <a:buFont typeface="Arial" panose="020B0604020202020204" pitchFamily="34" charset="0"/>
+              <a:buChar char="•"/>
+            </a:pPr>
+            <a:r>
+              <a:rPr lang="en-AU" dirty="0" smtClean="0"/>
+              <a:t>Attendees found the previous course a little fast and reported the main barriers to using python as not havin</a:t>
+            </a:r>
+            <a:r>
+              <a:rPr lang="en-AU" dirty="0" smtClean="0"/>
+              <a:t>g the confidence and not having enough time.</a:t>
+            </a:r>
+          </a:p>
+          <a:p>
+            <a:pPr marL="342900" indent="-342900">
+              <a:buFont typeface="Arial" panose="020B0604020202020204" pitchFamily="34" charset="0"/>
+              <a:buChar char="•"/>
+            </a:pPr>
+            <a:r>
+              <a:rPr lang="en-AU" dirty="0" smtClean="0"/>
+              <a:t>We have incorporated a lot of the comments for further support – slack channel, dedicated tutor, help desk at later sessions.</a:t>
+            </a:r>
+            <a:endParaRPr lang="en-AU" dirty="0" smtClean="0"/>
+          </a:p>
+          <a:p>
+            <a:endParaRPr lang="en-AU" dirty="0" smtClean="0"/>
+          </a:p>
+          <a:p>
+            <a:endParaRPr lang="en-AU" dirty="0"/>
+          </a:p>
+        </p:txBody>
+      </p:sp>
+    </p:spTree>
+    <p:extLst>
+      <p:ext uri="{BB962C8B-B14F-4D97-AF65-F5344CB8AC3E}">
+        <p14:creationId xmlns:p14="http://schemas.microsoft.com/office/powerpoint/2010/main" val="3880301100"/>
       </p:ext>
     </p:extLst>
   </p:cSld>
@@ -26200,7 +26208,11 @@
             </a:pPr>
             <a:r>
               <a:rPr lang="en-AU" dirty="0" smtClean="0"/>
-              <a:t>What is Python?</a:t>
+              <a:t>What </a:t>
+            </a:r>
+            <a:r>
+              <a:rPr lang="en-AU" dirty="0" smtClean="0"/>
+              <a:t>is Python?</a:t>
             </a:r>
           </a:p>
           <a:p>
@@ -26216,7 +26228,6 @@
               <a:rPr lang="en-AU" dirty="0" smtClean="0"/>
               <a:t>course.</a:t>
             </a:r>
-            <a:endParaRPr lang="en-AU" dirty="0" smtClean="0"/>
           </a:p>
           <a:p>
             <a:pPr marL="342900" indent="-342900">
@@ -26237,7 +26248,6 @@
               <a:rPr lang="en-AU" dirty="0" smtClean="0"/>
               <a:t>Is this course right for you.</a:t>
             </a:r>
-            <a:endParaRPr lang="en-AU" dirty="0" smtClean="0"/>
           </a:p>
           <a:p>
             <a:pPr marL="342900" indent="-342900">
@@ -26248,7 +26258,6 @@
               <a:rPr lang="en-AU" dirty="0" smtClean="0"/>
               <a:t>Q&amp;A</a:t>
             </a:r>
-            <a:endParaRPr lang="en-AU" dirty="0" smtClean="0"/>
           </a:p>
           <a:p>
             <a:endParaRPr lang="en-AU" dirty="0" smtClean="0"/>
@@ -26394,38 +26403,8 @@
                 <a:ea typeface="+mj-ea"/>
                 <a:cs typeface="Times New Roman"/>
               </a:rPr>
-              <a:t>(What is computer </a:t>
-            </a:r>
-            <a:r>
-              <a:rPr lang="en-AU" sz="2800" dirty="0">
-                <a:solidFill>
-                  <a:schemeClr val="accent2"/>
-                </a:solidFill>
-                <a:latin typeface="Times New Roman"/>
-                <a:ea typeface="+mj-ea"/>
-                <a:cs typeface="Times New Roman"/>
-              </a:rPr>
-              <a:t>programming</a:t>
-            </a:r>
-            <a:r>
-              <a:rPr lang="en-AU" sz="2800" dirty="0">
-                <a:solidFill>
-                  <a:schemeClr val="accent2"/>
-                </a:solidFill>
-                <a:latin typeface="Times New Roman"/>
-                <a:ea typeface="+mj-ea"/>
-                <a:cs typeface="Times New Roman"/>
-              </a:rPr>
-              <a:t>?)</a:t>
-            </a:r>
-            <a:endParaRPr lang="en-AU" sz="2800" dirty="0">
-              <a:solidFill>
-                <a:schemeClr val="accent2"/>
-              </a:solidFill>
-              <a:latin typeface="Times New Roman"/>
-              <a:ea typeface="+mj-ea"/>
-              <a:cs typeface="Times New Roman"/>
-            </a:endParaRPr>
+              <a:t>(What is computer programming?)</a:t>
+            </a:r>
           </a:p>
         </p:txBody>
       </p:sp>
@@ -26562,38 +26541,8 @@
                 <a:ea typeface="+mj-ea"/>
                 <a:cs typeface="Times New Roman"/>
               </a:rPr>
-              <a:t>(What is computer </a:t>
-            </a:r>
-            <a:r>
-              <a:rPr lang="en-AU" sz="2800" dirty="0">
-                <a:solidFill>
-                  <a:schemeClr val="accent2"/>
-                </a:solidFill>
-                <a:latin typeface="Times New Roman"/>
-                <a:ea typeface="+mj-ea"/>
-                <a:cs typeface="Times New Roman"/>
-              </a:rPr>
-              <a:t>programming</a:t>
-            </a:r>
-            <a:r>
-              <a:rPr lang="en-AU" sz="2800" dirty="0">
-                <a:solidFill>
-                  <a:schemeClr val="accent2"/>
-                </a:solidFill>
-                <a:latin typeface="Times New Roman"/>
-                <a:ea typeface="+mj-ea"/>
-                <a:cs typeface="Times New Roman"/>
-              </a:rPr>
-              <a:t>?)</a:t>
-            </a:r>
-            <a:endParaRPr lang="en-AU" sz="2800" dirty="0">
-              <a:solidFill>
-                <a:schemeClr val="accent2"/>
-              </a:solidFill>
-              <a:latin typeface="Times New Roman"/>
-              <a:ea typeface="+mj-ea"/>
-              <a:cs typeface="Times New Roman"/>
-            </a:endParaRPr>
+              <a:t>(What is computer programming?)</a:t>
+            </a:r>
           </a:p>
         </p:txBody>
       </p:sp>
@@ -26753,38 +26702,8 @@
                 <a:ea typeface="+mj-ea"/>
                 <a:cs typeface="Times New Roman"/>
               </a:rPr>
-              <a:t>(What is computer </a:t>
-            </a:r>
-            <a:r>
-              <a:rPr lang="en-AU" sz="2800" dirty="0">
-                <a:solidFill>
-                  <a:schemeClr val="accent2"/>
-                </a:solidFill>
-                <a:latin typeface="Times New Roman"/>
-                <a:ea typeface="+mj-ea"/>
-                <a:cs typeface="Times New Roman"/>
-              </a:rPr>
-              <a:t>programming</a:t>
-            </a:r>
-            <a:r>
-              <a:rPr lang="en-AU" sz="2800" dirty="0">
-                <a:solidFill>
-                  <a:schemeClr val="accent2"/>
-                </a:solidFill>
-                <a:latin typeface="Times New Roman"/>
-                <a:ea typeface="+mj-ea"/>
-                <a:cs typeface="Times New Roman"/>
-              </a:rPr>
-              <a:t>?)</a:t>
-            </a:r>
-            <a:endParaRPr lang="en-AU" sz="2800" dirty="0">
-              <a:solidFill>
-                <a:schemeClr val="accent2"/>
-              </a:solidFill>
-              <a:latin typeface="Times New Roman"/>
-              <a:ea typeface="+mj-ea"/>
-              <a:cs typeface="Times New Roman"/>
-            </a:endParaRPr>
+              <a:t>(What is computer programming?)</a:t>
+            </a:r>
           </a:p>
         </p:txBody>
       </p:sp>
@@ -26921,38 +26840,8 @@
                 <a:ea typeface="+mj-ea"/>
                 <a:cs typeface="Times New Roman"/>
               </a:rPr>
-              <a:t>(What is computer </a:t>
-            </a:r>
-            <a:r>
-              <a:rPr lang="en-AU" sz="2800" dirty="0">
-                <a:solidFill>
-                  <a:schemeClr val="accent2"/>
-                </a:solidFill>
-                <a:latin typeface="Times New Roman"/>
-                <a:ea typeface="+mj-ea"/>
-                <a:cs typeface="Times New Roman"/>
-              </a:rPr>
-              <a:t>programming</a:t>
-            </a:r>
-            <a:r>
-              <a:rPr lang="en-AU" sz="2800" dirty="0">
-                <a:solidFill>
-                  <a:schemeClr val="accent2"/>
-                </a:solidFill>
-                <a:latin typeface="Times New Roman"/>
-                <a:ea typeface="+mj-ea"/>
-                <a:cs typeface="Times New Roman"/>
-              </a:rPr>
-              <a:t>?)</a:t>
-            </a:r>
-            <a:endParaRPr lang="en-AU" sz="2800" dirty="0">
-              <a:solidFill>
-                <a:schemeClr val="accent2"/>
-              </a:solidFill>
-              <a:latin typeface="Times New Roman"/>
-              <a:ea typeface="+mj-ea"/>
-              <a:cs typeface="Times New Roman"/>
-            </a:endParaRPr>
+              <a:t>(What is computer programming?)</a:t>
+            </a:r>
           </a:p>
         </p:txBody>
       </p:sp>

</xml_diff>